<commit_message>
updated formatting of sprint3 standup.md
</commit_message>
<xml_diff>
--- a/project_journal/standup/presentations/sprint3_standup.pptx
+++ b/project_journal/standup/presentations/sprint3_standup.pptx
@@ -5221,7 +5221,7 @@
           <a:p>
             <a:fld id="{C5760A9E-F5D7-4040-B515-3D966B4E754C}" type="datetimeFigureOut">
               <a:rPr lang="en-US" smtClean="0"/>
-              <a:t>6/9/2025</a:t>
+              <a:t>6/11/2025</a:t>
             </a:fld>
             <a:endParaRPr lang="en-US"/>
           </a:p>
@@ -5419,7 +5419,7 @@
           <a:p>
             <a:fld id="{C5760A9E-F5D7-4040-B515-3D966B4E754C}" type="datetimeFigureOut">
               <a:rPr lang="en-US" smtClean="0"/>
-              <a:t>6/9/2025</a:t>
+              <a:t>6/11/2025</a:t>
             </a:fld>
             <a:endParaRPr lang="en-US"/>
           </a:p>
@@ -5627,7 +5627,7 @@
           <a:p>
             <a:fld id="{C5760A9E-F5D7-4040-B515-3D966B4E754C}" type="datetimeFigureOut">
               <a:rPr lang="en-US" smtClean="0"/>
-              <a:t>6/9/2025</a:t>
+              <a:t>6/11/2025</a:t>
             </a:fld>
             <a:endParaRPr lang="en-US"/>
           </a:p>
@@ -5825,7 +5825,7 @@
           <a:p>
             <a:fld id="{C5760A9E-F5D7-4040-B515-3D966B4E754C}" type="datetimeFigureOut">
               <a:rPr lang="en-US" smtClean="0"/>
-              <a:t>6/9/2025</a:t>
+              <a:t>6/11/2025</a:t>
             </a:fld>
             <a:endParaRPr lang="en-US"/>
           </a:p>
@@ -6100,7 +6100,7 @@
           <a:p>
             <a:fld id="{C5760A9E-F5D7-4040-B515-3D966B4E754C}" type="datetimeFigureOut">
               <a:rPr lang="en-US" smtClean="0"/>
-              <a:t>6/9/2025</a:t>
+              <a:t>6/11/2025</a:t>
             </a:fld>
             <a:endParaRPr lang="en-US"/>
           </a:p>
@@ -6365,7 +6365,7 @@
           <a:p>
             <a:fld id="{C5760A9E-F5D7-4040-B515-3D966B4E754C}" type="datetimeFigureOut">
               <a:rPr lang="en-US" smtClean="0"/>
-              <a:t>6/9/2025</a:t>
+              <a:t>6/11/2025</a:t>
             </a:fld>
             <a:endParaRPr lang="en-US"/>
           </a:p>
@@ -6777,7 +6777,7 @@
           <a:p>
             <a:fld id="{C5760A9E-F5D7-4040-B515-3D966B4E754C}" type="datetimeFigureOut">
               <a:rPr lang="en-US" smtClean="0"/>
-              <a:t>6/9/2025</a:t>
+              <a:t>6/11/2025</a:t>
             </a:fld>
             <a:endParaRPr lang="en-US"/>
           </a:p>
@@ -6918,7 +6918,7 @@
           <a:p>
             <a:fld id="{C5760A9E-F5D7-4040-B515-3D966B4E754C}" type="datetimeFigureOut">
               <a:rPr lang="en-US" smtClean="0"/>
-              <a:t>6/9/2025</a:t>
+              <a:t>6/11/2025</a:t>
             </a:fld>
             <a:endParaRPr lang="en-US"/>
           </a:p>
@@ -7031,7 +7031,7 @@
           <a:p>
             <a:fld id="{C5760A9E-F5D7-4040-B515-3D966B4E754C}" type="datetimeFigureOut">
               <a:rPr lang="en-US" smtClean="0"/>
-              <a:t>6/9/2025</a:t>
+              <a:t>6/11/2025</a:t>
             </a:fld>
             <a:endParaRPr lang="en-US"/>
           </a:p>
@@ -7342,7 +7342,7 @@
           <a:p>
             <a:fld id="{C5760A9E-F5D7-4040-B515-3D966B4E754C}" type="datetimeFigureOut">
               <a:rPr lang="en-US" smtClean="0"/>
-              <a:t>6/9/2025</a:t>
+              <a:t>6/11/2025</a:t>
             </a:fld>
             <a:endParaRPr lang="en-US"/>
           </a:p>
@@ -7630,7 +7630,7 @@
           <a:p>
             <a:fld id="{C5760A9E-F5D7-4040-B515-3D966B4E754C}" type="datetimeFigureOut">
               <a:rPr lang="en-US" smtClean="0"/>
-              <a:t>6/9/2025</a:t>
+              <a:t>6/11/2025</a:t>
             </a:fld>
             <a:endParaRPr lang="en-US"/>
           </a:p>
@@ -7871,7 +7871,7 @@
           <a:p>
             <a:fld id="{C5760A9E-F5D7-4040-B515-3D966B4E754C}" type="datetimeFigureOut">
               <a:rPr lang="en-US" smtClean="0"/>
-              <a:t>6/9/2025</a:t>
+              <a:t>6/11/2025</a:t>
             </a:fld>
             <a:endParaRPr lang="en-US"/>
           </a:p>

</xml_diff>